<commit_message>
Rotating canvas on player move for health bar
Still need to update a whole bunch of stuff
also going to update the poster entirely at some point
</commit_message>
<xml_diff>
--- a/Convert This towards a poster.pptx
+++ b/Convert This towards a poster.pptx
@@ -104,6 +104,11 @@
       </a:defRPr>
     </a:lvl9pPr>
   </p:defaultTextStyle>
+  <p:extLst>
+    <p:ext uri="{EFAFB233-063F-42B5-8137-9DF3F51BA10A}">
+      <p15:sldGuideLst xmlns:p15="http://schemas.microsoft.com/office/powerpoint/2012/main"/>
+    </p:ext>
+  </p:extLst>
 </p:presentation>
 </file>
 
@@ -256,7 +261,7 @@
           <a:p>
             <a:fld id="{0A17F288-43E9-4281-AD19-8E2950B77AB2}" type="datetimeFigureOut">
               <a:rPr lang="en-GB" smtClean="0"/>
-              <a:t>07/05/2025</a:t>
+              <a:t>11/05/2025</a:t>
             </a:fld>
             <a:endParaRPr lang="en-GB"/>
           </a:p>
@@ -456,7 +461,7 @@
           <a:p>
             <a:fld id="{0A17F288-43E9-4281-AD19-8E2950B77AB2}" type="datetimeFigureOut">
               <a:rPr lang="en-GB" smtClean="0"/>
-              <a:t>07/05/2025</a:t>
+              <a:t>11/05/2025</a:t>
             </a:fld>
             <a:endParaRPr lang="en-GB"/>
           </a:p>
@@ -666,7 +671,7 @@
           <a:p>
             <a:fld id="{0A17F288-43E9-4281-AD19-8E2950B77AB2}" type="datetimeFigureOut">
               <a:rPr lang="en-GB" smtClean="0"/>
-              <a:t>07/05/2025</a:t>
+              <a:t>11/05/2025</a:t>
             </a:fld>
             <a:endParaRPr lang="en-GB"/>
           </a:p>
@@ -866,7 +871,7 @@
           <a:p>
             <a:fld id="{0A17F288-43E9-4281-AD19-8E2950B77AB2}" type="datetimeFigureOut">
               <a:rPr lang="en-GB" smtClean="0"/>
-              <a:t>07/05/2025</a:t>
+              <a:t>11/05/2025</a:t>
             </a:fld>
             <a:endParaRPr lang="en-GB"/>
           </a:p>
@@ -1142,7 +1147,7 @@
           <a:p>
             <a:fld id="{0A17F288-43E9-4281-AD19-8E2950B77AB2}" type="datetimeFigureOut">
               <a:rPr lang="en-GB" smtClean="0"/>
-              <a:t>07/05/2025</a:t>
+              <a:t>11/05/2025</a:t>
             </a:fld>
             <a:endParaRPr lang="en-GB"/>
           </a:p>
@@ -1410,7 +1415,7 @@
           <a:p>
             <a:fld id="{0A17F288-43E9-4281-AD19-8E2950B77AB2}" type="datetimeFigureOut">
               <a:rPr lang="en-GB" smtClean="0"/>
-              <a:t>07/05/2025</a:t>
+              <a:t>11/05/2025</a:t>
             </a:fld>
             <a:endParaRPr lang="en-GB"/>
           </a:p>
@@ -1825,7 +1830,7 @@
           <a:p>
             <a:fld id="{0A17F288-43E9-4281-AD19-8E2950B77AB2}" type="datetimeFigureOut">
               <a:rPr lang="en-GB" smtClean="0"/>
-              <a:t>07/05/2025</a:t>
+              <a:t>11/05/2025</a:t>
             </a:fld>
             <a:endParaRPr lang="en-GB"/>
           </a:p>
@@ -1967,7 +1972,7 @@
           <a:p>
             <a:fld id="{0A17F288-43E9-4281-AD19-8E2950B77AB2}" type="datetimeFigureOut">
               <a:rPr lang="en-GB" smtClean="0"/>
-              <a:t>07/05/2025</a:t>
+              <a:t>11/05/2025</a:t>
             </a:fld>
             <a:endParaRPr lang="en-GB"/>
           </a:p>
@@ -2080,7 +2085,7 @@
           <a:p>
             <a:fld id="{0A17F288-43E9-4281-AD19-8E2950B77AB2}" type="datetimeFigureOut">
               <a:rPr lang="en-GB" smtClean="0"/>
-              <a:t>07/05/2025</a:t>
+              <a:t>11/05/2025</a:t>
             </a:fld>
             <a:endParaRPr lang="en-GB"/>
           </a:p>
@@ -2393,7 +2398,7 @@
           <a:p>
             <a:fld id="{0A17F288-43E9-4281-AD19-8E2950B77AB2}" type="datetimeFigureOut">
               <a:rPr lang="en-GB" smtClean="0"/>
-              <a:t>07/05/2025</a:t>
+              <a:t>11/05/2025</a:t>
             </a:fld>
             <a:endParaRPr lang="en-GB"/>
           </a:p>
@@ -2682,7 +2687,7 @@
           <a:p>
             <a:fld id="{0A17F288-43E9-4281-AD19-8E2950B77AB2}" type="datetimeFigureOut">
               <a:rPr lang="en-GB" smtClean="0"/>
-              <a:t>07/05/2025</a:t>
+              <a:t>11/05/2025</a:t>
             </a:fld>
             <a:endParaRPr lang="en-GB"/>
           </a:p>
@@ -2925,7 +2930,7 @@
           <a:p>
             <a:fld id="{0A17F288-43E9-4281-AD19-8E2950B77AB2}" type="datetimeFigureOut">
               <a:rPr lang="en-GB" smtClean="0"/>
-              <a:t>07/05/2025</a:t>
+              <a:t>11/05/2025</a:t>
             </a:fld>
             <a:endParaRPr lang="en-GB"/>
           </a:p>
@@ -3344,51 +3349,138 @@
       </p:grpSpPr>
       <p:sp>
         <p:nvSpPr>
-          <p:cNvPr id="2" name="Title 1">
-            <a:extLst>
-              <a:ext uri="{FF2B5EF4-FFF2-40B4-BE49-F238E27FC236}">
-                <a16:creationId xmlns:a16="http://schemas.microsoft.com/office/drawing/2014/main" id="{0249F46B-FBDA-AB92-76B5-3C075C15F2E1}"/>
-              </a:ext>
-            </a:extLst>
-          </p:cNvPr>
-          <p:cNvSpPr>
-            <a:spLocks noGrp="1"/>
-          </p:cNvSpPr>
-          <p:nvPr>
-            <p:ph type="ctrTitle"/>
-          </p:nvPr>
-        </p:nvSpPr>
-        <p:spPr/>
-        <p:txBody>
-          <a:bodyPr/>
-          <a:lstStyle/>
-          <a:p>
-            <a:endParaRPr lang="en-GB"/>
-          </a:p>
-        </p:txBody>
-      </p:sp>
-      <p:sp>
-        <p:nvSpPr>
-          <p:cNvPr id="3" name="Subtitle 2">
-            <a:extLst>
-              <a:ext uri="{FF2B5EF4-FFF2-40B4-BE49-F238E27FC236}">
-                <a16:creationId xmlns:a16="http://schemas.microsoft.com/office/drawing/2014/main" id="{FF57CE58-0448-0823-47C1-241AB65DB681}"/>
-              </a:ext>
-            </a:extLst>
-          </p:cNvPr>
-          <p:cNvSpPr>
-            <a:spLocks noGrp="1"/>
-          </p:cNvSpPr>
-          <p:nvPr>
-            <p:ph type="subTitle" idx="1"/>
-          </p:nvPr>
-        </p:nvSpPr>
-        <p:spPr/>
-        <p:txBody>
-          <a:bodyPr/>
-          <a:lstStyle/>
-          <a:p>
-            <a:endParaRPr lang="en-GB"/>
+          <p:cNvPr id="4" name="TextBox 3">
+            <a:extLst>
+              <a:ext uri="{FF2B5EF4-FFF2-40B4-BE49-F238E27FC236}">
+                <a16:creationId xmlns:a16="http://schemas.microsoft.com/office/drawing/2014/main" id="{A0AD5822-888A-BC61-D17C-11DAB3DCE175}"/>
+              </a:ext>
+            </a:extLst>
+          </p:cNvPr>
+          <p:cNvSpPr txBox="1"/>
+          <p:nvPr/>
+        </p:nvSpPr>
+        <p:spPr>
+          <a:xfrm>
+            <a:off x="0" y="2619375"/>
+            <a:ext cx="5114441" cy="923330"/>
+          </a:xfrm>
+          <a:prstGeom prst="rect">
+            <a:avLst/>
+          </a:prstGeom>
+          <a:noFill/>
+        </p:spPr>
+        <p:txBody>
+          <a:bodyPr wrap="square" rtlCol="0">
+            <a:spAutoFit/>
+          </a:bodyPr>
+          <a:lstStyle/>
+          <a:p>
+            <a:r>
+              <a:rPr lang="en-GB"/>
+              <a:t>1. Introduction:</a:t>
+            </a:r>
+            <a:br>
+              <a:rPr lang="en-GB"/>
+            </a:br>
+            <a:r>
+              <a:rPr lang="en-US"/>
+              <a:t>Does AI and assisted gameplay benefit players, or create unfair advantage?</a:t>
+            </a:r>
+            <a:endParaRPr lang="en-GB" dirty="0"/>
+          </a:p>
+        </p:txBody>
+      </p:sp>
+      <p:sp>
+        <p:nvSpPr>
+          <p:cNvPr id="5" name="Rectangle 4">
+            <a:extLst>
+              <a:ext uri="{FF2B5EF4-FFF2-40B4-BE49-F238E27FC236}">
+                <a16:creationId xmlns:a16="http://schemas.microsoft.com/office/drawing/2014/main" id="{4EAC555A-49B5-2869-B728-988BF874D6B1}"/>
+              </a:ext>
+            </a:extLst>
+          </p:cNvPr>
+          <p:cNvSpPr/>
+          <p:nvPr/>
+        </p:nvSpPr>
+        <p:spPr>
+          <a:xfrm>
+            <a:off x="-1" y="-180380"/>
+            <a:ext cx="12192001" cy="1754326"/>
+          </a:xfrm>
+          <a:prstGeom prst="rect">
+            <a:avLst/>
+          </a:prstGeom>
+          <a:noFill/>
+        </p:spPr>
+        <p:txBody>
+          <a:bodyPr wrap="square" lIns="91440" tIns="45720" rIns="91440" bIns="45720">
+            <a:spAutoFit/>
+          </a:bodyPr>
+          <a:lstStyle/>
+          <a:p>
+            <a:pPr algn="ctr"/>
+            <a:r>
+              <a:rPr lang="en-US" sz="5400" b="1" cap="none" spc="0" dirty="0">
+                <a:ln w="13462">
+                  <a:solidFill>
+                    <a:schemeClr val="bg1"/>
+                  </a:solidFill>
+                  <a:prstDash val="solid"/>
+                </a:ln>
+                <a:solidFill>
+                  <a:schemeClr val="tx1">
+                    <a:lumMod val="85000"/>
+                    <a:lumOff val="15000"/>
+                  </a:schemeClr>
+                </a:solidFill>
+                <a:effectLst>
+                  <a:outerShdw dist="38100" dir="2700000" algn="bl" rotWithShape="0">
+                    <a:schemeClr val="accent5"/>
+                  </a:outerShdw>
+                </a:effectLst>
+              </a:rPr>
+              <a:t>A PRACTICAL EXAMPLE OF THIRD PERSON ASSISTED GAMEPLAY</a:t>
+            </a:r>
+          </a:p>
+        </p:txBody>
+      </p:sp>
+      <p:sp>
+        <p:nvSpPr>
+          <p:cNvPr id="6" name="TextBox 5">
+            <a:extLst>
+              <a:ext uri="{FF2B5EF4-FFF2-40B4-BE49-F238E27FC236}">
+                <a16:creationId xmlns:a16="http://schemas.microsoft.com/office/drawing/2014/main" id="{C8177812-753F-4446-4327-D7061BBB4287}"/>
+              </a:ext>
+            </a:extLst>
+          </p:cNvPr>
+          <p:cNvSpPr txBox="1"/>
+          <p:nvPr/>
+        </p:nvSpPr>
+        <p:spPr>
+          <a:xfrm>
+            <a:off x="1041399" y="4473575"/>
+            <a:ext cx="5114441" cy="369332"/>
+          </a:xfrm>
+          <a:prstGeom prst="rect">
+            <a:avLst/>
+          </a:prstGeom>
+          <a:noFill/>
+        </p:spPr>
+        <p:txBody>
+          <a:bodyPr wrap="square" rtlCol="0">
+            <a:spAutoFit/>
+          </a:bodyPr>
+          <a:lstStyle/>
+          <a:p>
+            <a:r>
+              <a:rPr lang="en-GB" dirty="0"/>
+              <a:t>Aim </a:t>
+            </a:r>
+            <a:r>
+              <a:rPr lang="en-GB"/>
+              <a:t>Assist Toggle</a:t>
+            </a:r>
+            <a:endParaRPr lang="en-GB" dirty="0"/>
           </a:p>
         </p:txBody>
       </p:sp>

</xml_diff>

<commit_message>
Popup damage indication/Expanded UI element need to fix lock on
PowerPoint is going to need major updates
</commit_message>
<xml_diff>
--- a/Convert This towards a poster.pptx
+++ b/Convert This towards a poster.pptx
@@ -261,7 +261,7 @@
           <a:p>
             <a:fld id="{0A17F288-43E9-4281-AD19-8E2950B77AB2}" type="datetimeFigureOut">
               <a:rPr lang="en-GB" smtClean="0"/>
-              <a:t>16/05/2025</a:t>
+              <a:t>19/05/2025</a:t>
             </a:fld>
             <a:endParaRPr lang="en-GB"/>
           </a:p>
@@ -461,7 +461,7 @@
           <a:p>
             <a:fld id="{0A17F288-43E9-4281-AD19-8E2950B77AB2}" type="datetimeFigureOut">
               <a:rPr lang="en-GB" smtClean="0"/>
-              <a:t>16/05/2025</a:t>
+              <a:t>19/05/2025</a:t>
             </a:fld>
             <a:endParaRPr lang="en-GB"/>
           </a:p>
@@ -671,7 +671,7 @@
           <a:p>
             <a:fld id="{0A17F288-43E9-4281-AD19-8E2950B77AB2}" type="datetimeFigureOut">
               <a:rPr lang="en-GB" smtClean="0"/>
-              <a:t>16/05/2025</a:t>
+              <a:t>19/05/2025</a:t>
             </a:fld>
             <a:endParaRPr lang="en-GB"/>
           </a:p>
@@ -871,7 +871,7 @@
           <a:p>
             <a:fld id="{0A17F288-43E9-4281-AD19-8E2950B77AB2}" type="datetimeFigureOut">
               <a:rPr lang="en-GB" smtClean="0"/>
-              <a:t>16/05/2025</a:t>
+              <a:t>19/05/2025</a:t>
             </a:fld>
             <a:endParaRPr lang="en-GB"/>
           </a:p>
@@ -1147,7 +1147,7 @@
           <a:p>
             <a:fld id="{0A17F288-43E9-4281-AD19-8E2950B77AB2}" type="datetimeFigureOut">
               <a:rPr lang="en-GB" smtClean="0"/>
-              <a:t>16/05/2025</a:t>
+              <a:t>19/05/2025</a:t>
             </a:fld>
             <a:endParaRPr lang="en-GB"/>
           </a:p>
@@ -1415,7 +1415,7 @@
           <a:p>
             <a:fld id="{0A17F288-43E9-4281-AD19-8E2950B77AB2}" type="datetimeFigureOut">
               <a:rPr lang="en-GB" smtClean="0"/>
-              <a:t>16/05/2025</a:t>
+              <a:t>19/05/2025</a:t>
             </a:fld>
             <a:endParaRPr lang="en-GB"/>
           </a:p>
@@ -1830,7 +1830,7 @@
           <a:p>
             <a:fld id="{0A17F288-43E9-4281-AD19-8E2950B77AB2}" type="datetimeFigureOut">
               <a:rPr lang="en-GB" smtClean="0"/>
-              <a:t>16/05/2025</a:t>
+              <a:t>19/05/2025</a:t>
             </a:fld>
             <a:endParaRPr lang="en-GB"/>
           </a:p>
@@ -1972,7 +1972,7 @@
           <a:p>
             <a:fld id="{0A17F288-43E9-4281-AD19-8E2950B77AB2}" type="datetimeFigureOut">
               <a:rPr lang="en-GB" smtClean="0"/>
-              <a:t>16/05/2025</a:t>
+              <a:t>19/05/2025</a:t>
             </a:fld>
             <a:endParaRPr lang="en-GB"/>
           </a:p>
@@ -2085,7 +2085,7 @@
           <a:p>
             <a:fld id="{0A17F288-43E9-4281-AD19-8E2950B77AB2}" type="datetimeFigureOut">
               <a:rPr lang="en-GB" smtClean="0"/>
-              <a:t>16/05/2025</a:t>
+              <a:t>19/05/2025</a:t>
             </a:fld>
             <a:endParaRPr lang="en-GB"/>
           </a:p>
@@ -2398,7 +2398,7 @@
           <a:p>
             <a:fld id="{0A17F288-43E9-4281-AD19-8E2950B77AB2}" type="datetimeFigureOut">
               <a:rPr lang="en-GB" smtClean="0"/>
-              <a:t>16/05/2025</a:t>
+              <a:t>19/05/2025</a:t>
             </a:fld>
             <a:endParaRPr lang="en-GB"/>
           </a:p>
@@ -2687,7 +2687,7 @@
           <a:p>
             <a:fld id="{0A17F288-43E9-4281-AD19-8E2950B77AB2}" type="datetimeFigureOut">
               <a:rPr lang="en-GB" smtClean="0"/>
-              <a:t>16/05/2025</a:t>
+              <a:t>19/05/2025</a:t>
             </a:fld>
             <a:endParaRPr lang="en-GB"/>
           </a:p>
@@ -2930,7 +2930,7 @@
           <a:p>
             <a:fld id="{0A17F288-43E9-4281-AD19-8E2950B77AB2}" type="datetimeFigureOut">
               <a:rPr lang="en-GB" smtClean="0"/>
-              <a:t>16/05/2025</a:t>
+              <a:t>19/05/2025</a:t>
             </a:fld>
             <a:endParaRPr lang="en-GB"/>
           </a:p>
@@ -3349,20 +3349,20 @@
       </p:grpSpPr>
       <p:sp>
         <p:nvSpPr>
-          <p:cNvPr id="4" name="TextBox 3">
-            <a:extLst>
-              <a:ext uri="{FF2B5EF4-FFF2-40B4-BE49-F238E27FC236}">
-                <a16:creationId xmlns:a16="http://schemas.microsoft.com/office/drawing/2014/main" id="{A0AD5822-888A-BC61-D17C-11DAB3DCE175}"/>
-              </a:ext>
-            </a:extLst>
-          </p:cNvPr>
-          <p:cNvSpPr txBox="1"/>
+          <p:cNvPr id="8" name="Rectangle 7">
+            <a:extLst>
+              <a:ext uri="{FF2B5EF4-FFF2-40B4-BE49-F238E27FC236}">
+                <a16:creationId xmlns:a16="http://schemas.microsoft.com/office/drawing/2014/main" id="{740688F6-C548-240B-56F8-4A04680D2498}"/>
+              </a:ext>
+            </a:extLst>
+          </p:cNvPr>
+          <p:cNvSpPr/>
           <p:nvPr/>
         </p:nvSpPr>
         <p:spPr>
           <a:xfrm>
-            <a:off x="0" y="2619375"/>
-            <a:ext cx="5114441" cy="369332"/>
+            <a:off x="0" y="-49979"/>
+            <a:ext cx="12192000" cy="461665"/>
           </a:xfrm>
           <a:prstGeom prst="rect">
             <a:avLst/>
@@ -3370,24 +3370,74 @@
           <a:noFill/>
         </p:spPr>
         <p:txBody>
-          <a:bodyPr wrap="square" rtlCol="0">
+          <a:bodyPr wrap="square" lIns="91440" tIns="45720" rIns="91440" bIns="45720">
             <a:spAutoFit/>
           </a:bodyPr>
           <a:lstStyle/>
           <a:p>
-            <a:r>
-              <a:rPr lang="en-GB" dirty="0"/>
-              <a:t>Introduction</a:t>
-            </a:r>
-          </a:p>
-        </p:txBody>
-      </p:sp>
-      <p:sp>
-        <p:nvSpPr>
-          <p:cNvPr id="5" name="Rectangle 4">
-            <a:extLst>
-              <a:ext uri="{FF2B5EF4-FFF2-40B4-BE49-F238E27FC236}">
-                <a16:creationId xmlns:a16="http://schemas.microsoft.com/office/drawing/2014/main" id="{4EAC555A-49B5-2869-B728-988BF874D6B1}"/>
+            <a:pPr algn="ctr"/>
+            <a:r>
+              <a:rPr lang="en-US" sz="2400" dirty="0"/>
+              <a:t>Player vs AI: Aim Assist Showdown</a:t>
+            </a:r>
+            <a:endParaRPr lang="en-US" sz="2400" b="0" cap="none" spc="0" dirty="0">
+              <a:ln w="0"/>
+              <a:solidFill>
+                <a:schemeClr val="tx1"/>
+              </a:solidFill>
+              <a:effectLst>
+                <a:outerShdw blurRad="38100" dist="19050" dir="2700000" algn="tl" rotWithShape="0">
+                  <a:schemeClr val="dk1">
+                    <a:alpha val="40000"/>
+                  </a:schemeClr>
+                </a:outerShdw>
+              </a:effectLst>
+            </a:endParaRPr>
+          </a:p>
+        </p:txBody>
+      </p:sp>
+      <p:pic>
+        <p:nvPicPr>
+          <p:cNvPr id="11" name="Picture 10" descr="A grey camera on a white background&#10;&#10;AI-generated content may be incorrect.">
+            <a:extLst>
+              <a:ext uri="{FF2B5EF4-FFF2-40B4-BE49-F238E27FC236}">
+                <a16:creationId xmlns:a16="http://schemas.microsoft.com/office/drawing/2014/main" id="{3FAF70AE-51AD-180D-C42D-F86A51BFC47F}"/>
+              </a:ext>
+            </a:extLst>
+          </p:cNvPr>
+          <p:cNvPicPr>
+            <a:picLocks noChangeAspect="1"/>
+          </p:cNvPicPr>
+          <p:nvPr/>
+        </p:nvPicPr>
+        <p:blipFill>
+          <a:blip r:embed="rId2">
+            <a:extLst>
+              <a:ext uri="{28A0092B-C50C-407E-A947-70E740481C1C}">
+                <a14:useLocalDpi xmlns:a14="http://schemas.microsoft.com/office/drawing/2010/main" val="0"/>
+              </a:ext>
+            </a:extLst>
+          </a:blip>
+          <a:stretch>
+            <a:fillRect/>
+          </a:stretch>
+        </p:blipFill>
+        <p:spPr>
+          <a:xfrm>
+            <a:off x="5903915" y="828954"/>
+            <a:ext cx="3086100" cy="3086100"/>
+          </a:xfrm>
+          <a:prstGeom prst="rect">
+            <a:avLst/>
+          </a:prstGeom>
+        </p:spPr>
+      </p:pic>
+      <p:sp>
+        <p:nvSpPr>
+          <p:cNvPr id="12" name="Rectangle 11">
+            <a:extLst>
+              <a:ext uri="{FF2B5EF4-FFF2-40B4-BE49-F238E27FC236}">
+                <a16:creationId xmlns:a16="http://schemas.microsoft.com/office/drawing/2014/main" id="{D399D0D6-38F4-B8F6-3DA3-1D9BE000D7A7}"/>
               </a:ext>
             </a:extLst>
           </p:cNvPr>
@@ -3396,8 +3446,8 @@
         </p:nvSpPr>
         <p:spPr>
           <a:xfrm>
-            <a:off x="-1" y="-180380"/>
-            <a:ext cx="12192001" cy="1754326"/>
+            <a:off x="0" y="367289"/>
+            <a:ext cx="12192000" cy="461665"/>
           </a:xfrm>
           <a:prstGeom prst="rect">
             <a:avLst/>
@@ -3412,36 +3462,31 @@
           <a:p>
             <a:pPr algn="ctr"/>
             <a:r>
-              <a:rPr lang="en-US" sz="5400" b="1" cap="none" spc="0" dirty="0">
-                <a:ln w="13462">
-                  <a:solidFill>
-                    <a:schemeClr val="bg1"/>
-                  </a:solidFill>
-                  <a:prstDash val="solid"/>
-                </a:ln>
-                <a:solidFill>
-                  <a:schemeClr val="tx1">
-                    <a:lumMod val="85000"/>
-                    <a:lumOff val="15000"/>
+              <a:rPr lang="en-US" sz="2400" dirty="0"/>
+              <a:t>Investigating Smart Targeting Systems and Fair Gameplay</a:t>
+            </a:r>
+            <a:endParaRPr lang="en-US" sz="2400" b="0" cap="none" spc="0" dirty="0">
+              <a:ln w="0"/>
+              <a:solidFill>
+                <a:schemeClr val="tx1"/>
+              </a:solidFill>
+              <a:effectLst>
+                <a:outerShdw blurRad="38100" dist="19050" dir="2700000" algn="tl" rotWithShape="0">
+                  <a:schemeClr val="dk1">
+                    <a:alpha val="40000"/>
                   </a:schemeClr>
-                </a:solidFill>
-                <a:effectLst>
-                  <a:outerShdw dist="38100" dir="2700000" algn="bl" rotWithShape="0">
-                    <a:schemeClr val="accent5"/>
-                  </a:outerShdw>
-                </a:effectLst>
-              </a:rPr>
-              <a:t>A PRACTICAL EXAMPLE OF THIRD PERSON ASSISTED GAMEPLAY</a:t>
-            </a:r>
-          </a:p>
-        </p:txBody>
-      </p:sp>
-      <p:sp>
-        <p:nvSpPr>
-          <p:cNvPr id="6" name="TextBox 5">
-            <a:extLst>
-              <a:ext uri="{FF2B5EF4-FFF2-40B4-BE49-F238E27FC236}">
-                <a16:creationId xmlns:a16="http://schemas.microsoft.com/office/drawing/2014/main" id="{C8177812-753F-4446-4327-D7061BBB4287}"/>
+                </a:outerShdw>
+              </a:effectLst>
+            </a:endParaRPr>
+          </a:p>
+        </p:txBody>
+      </p:sp>
+      <p:sp>
+        <p:nvSpPr>
+          <p:cNvPr id="13" name="TextBox 12">
+            <a:extLst>
+              <a:ext uri="{FF2B5EF4-FFF2-40B4-BE49-F238E27FC236}">
+                <a16:creationId xmlns:a16="http://schemas.microsoft.com/office/drawing/2014/main" id="{C623F16D-0E2C-FE6C-FEBB-16059EFDDEA8}"/>
               </a:ext>
             </a:extLst>
           </p:cNvPr>
@@ -3450,8 +3495,8 @@
         </p:nvSpPr>
         <p:spPr>
           <a:xfrm>
-            <a:off x="-1" y="3865870"/>
-            <a:ext cx="5114441" cy="369332"/>
+            <a:off x="-38100" y="862757"/>
+            <a:ext cx="3086100" cy="3970318"/>
           </a:xfrm>
           <a:prstGeom prst="rect">
             <a:avLst/>
@@ -3464,29 +3509,166 @@
           </a:bodyPr>
           <a:lstStyle/>
           <a:p>
-            <a:r>
+            <a:pPr marL="0" marR="0" lvl="0" indent="0" algn="l" defTabSz="914400" rtl="0" eaLnBrk="0" fontAlgn="base" latinLnBrk="0" hangingPunct="0">
+              <a:lnSpc>
+                <a:spcPct val="100000"/>
+              </a:lnSpc>
+              <a:spcBef>
+                <a:spcPct val="0"/>
+              </a:spcBef>
+              <a:spcAft>
+                <a:spcPct val="0"/>
+              </a:spcAft>
+              <a:buClrTx/>
+              <a:buSzTx/>
+              <a:tabLst/>
+            </a:pPr>
+            <a:r>
+              <a:rPr lang="en-GB" u="sng" dirty="0"/>
+              <a:t>Background:</a:t>
+            </a:r>
+            <a:br>
               <a:rPr lang="en-GB" dirty="0"/>
-              <a:t>Aim Assist Toggle</a:t>
-            </a:r>
-          </a:p>
-        </p:txBody>
-      </p:sp>
-      <p:sp>
-        <p:nvSpPr>
-          <p:cNvPr id="2" name="Rectangle 1">
-            <a:extLst>
-              <a:ext uri="{FF2B5EF4-FFF2-40B4-BE49-F238E27FC236}">
-                <a16:creationId xmlns:a16="http://schemas.microsoft.com/office/drawing/2014/main" id="{9B09E473-56E7-4EC6-9CEA-D274FC09A1E5}"/>
-              </a:ext>
-            </a:extLst>
-          </p:cNvPr>
-          <p:cNvSpPr/>
+            </a:br>
+            <a:r>
+              <a:rPr kumimoji="0" lang="en-US" altLang="en-US" sz="1800" b="1" i="0" u="none" strike="noStrike" cap="none" normalizeH="0" baseline="0" dirty="0">
+                <a:ln>
+                  <a:noFill/>
+                </a:ln>
+                <a:solidFill>
+                  <a:schemeClr val="tx1"/>
+                </a:solidFill>
+                <a:effectLst/>
+                <a:latin typeface="Arial" panose="020B0604020202020204" pitchFamily="34" charset="0"/>
+              </a:rPr>
+              <a:t>Aim Assist</a:t>
+            </a:r>
+            <a:r>
+              <a:rPr kumimoji="0" lang="en-US" altLang="en-US" sz="1800" b="0" i="0" u="none" strike="noStrike" cap="none" normalizeH="0" baseline="0" dirty="0">
+                <a:ln>
+                  <a:noFill/>
+                </a:ln>
+                <a:solidFill>
+                  <a:schemeClr val="tx1"/>
+                </a:solidFill>
+                <a:effectLst/>
+                <a:latin typeface="Arial" panose="020B0604020202020204" pitchFamily="34" charset="0"/>
+              </a:rPr>
+              <a:t> is a game mechanic designed to help players align their aim with targets.</a:t>
+            </a:r>
+          </a:p>
+          <a:p>
+            <a:pPr marL="0" marR="0" lvl="0" indent="0" algn="l" defTabSz="914400" rtl="0" eaLnBrk="0" fontAlgn="base" latinLnBrk="0" hangingPunct="0">
+              <a:lnSpc>
+                <a:spcPct val="100000"/>
+              </a:lnSpc>
+              <a:spcBef>
+                <a:spcPct val="0"/>
+              </a:spcBef>
+              <a:spcAft>
+                <a:spcPct val="0"/>
+              </a:spcAft>
+              <a:buClrTx/>
+              <a:buSzTx/>
+              <a:buFontTx/>
+              <a:buChar char="•"/>
+              <a:tabLst/>
+            </a:pPr>
+            <a:r>
+              <a:rPr kumimoji="0" lang="en-US" altLang="en-US" sz="1800" b="0" i="0" u="none" strike="noStrike" cap="none" normalizeH="0" baseline="0" dirty="0">
+                <a:ln>
+                  <a:noFill/>
+                </a:ln>
+                <a:solidFill>
+                  <a:schemeClr val="tx1"/>
+                </a:solidFill>
+                <a:effectLst/>
+                <a:latin typeface="Arial" panose="020B0604020202020204" pitchFamily="34" charset="0"/>
+              </a:rPr>
+              <a:t>It's often used in console or accessibility-focused games.</a:t>
+            </a:r>
+          </a:p>
+          <a:p>
+            <a:pPr marL="0" marR="0" lvl="0" indent="0" algn="l" defTabSz="914400" rtl="0" eaLnBrk="0" fontAlgn="base" latinLnBrk="0" hangingPunct="0">
+              <a:lnSpc>
+                <a:spcPct val="100000"/>
+              </a:lnSpc>
+              <a:spcBef>
+                <a:spcPct val="0"/>
+              </a:spcBef>
+              <a:spcAft>
+                <a:spcPct val="0"/>
+              </a:spcAft>
+              <a:buClrTx/>
+              <a:buSzTx/>
+              <a:buFontTx/>
+              <a:buChar char="•"/>
+              <a:tabLst/>
+            </a:pPr>
+            <a:r>
+              <a:rPr kumimoji="0" lang="en-US" altLang="en-US" sz="1800" b="0" i="0" u="none" strike="noStrike" cap="none" normalizeH="0" baseline="0" dirty="0">
+                <a:ln>
+                  <a:noFill/>
+                </a:ln>
+                <a:solidFill>
+                  <a:schemeClr val="tx1"/>
+                </a:solidFill>
+                <a:effectLst/>
+                <a:latin typeface="Arial" panose="020B0604020202020204" pitchFamily="34" charset="0"/>
+              </a:rPr>
+              <a:t>Increasingly used in </a:t>
+            </a:r>
+            <a:r>
+              <a:rPr kumimoji="0" lang="en-US" altLang="en-US" sz="1800" b="1" i="0" u="none" strike="noStrike" cap="none" normalizeH="0" baseline="0" dirty="0">
+                <a:ln>
+                  <a:noFill/>
+                </a:ln>
+                <a:solidFill>
+                  <a:schemeClr val="tx1"/>
+                </a:solidFill>
+                <a:effectLst/>
+                <a:latin typeface="Arial" panose="020B0604020202020204" pitchFamily="34" charset="0"/>
+              </a:rPr>
+              <a:t>AI-assisted gameplay</a:t>
+            </a:r>
+            <a:r>
+              <a:rPr kumimoji="0" lang="en-US" altLang="en-US" sz="1800" b="0" i="0" u="none" strike="noStrike" cap="none" normalizeH="0" baseline="0" dirty="0">
+                <a:ln>
+                  <a:noFill/>
+                </a:ln>
+                <a:solidFill>
+                  <a:schemeClr val="tx1"/>
+                </a:solidFill>
+                <a:effectLst/>
+                <a:latin typeface="Arial" panose="020B0604020202020204" pitchFamily="34" charset="0"/>
+              </a:rPr>
+              <a:t> for smoother, more “human-like” responses.</a:t>
+            </a:r>
+          </a:p>
+          <a:p>
+            <a:br>
+              <a:rPr lang="en-GB" dirty="0"/>
+            </a:br>
+            <a:endParaRPr lang="en-GB" dirty="0"/>
+          </a:p>
+        </p:txBody>
+      </p:sp>
+      <p:sp>
+        <p:nvSpPr>
+          <p:cNvPr id="16" name="TextBox 15">
+            <a:extLst>
+              <a:ext uri="{FF2B5EF4-FFF2-40B4-BE49-F238E27FC236}">
+                <a16:creationId xmlns:a16="http://schemas.microsoft.com/office/drawing/2014/main" id="{7C19AB81-B75F-67AC-03DB-DE46F2628458}"/>
+              </a:ext>
+            </a:extLst>
+          </p:cNvPr>
+          <p:cNvSpPr txBox="1"/>
           <p:nvPr/>
         </p:nvSpPr>
         <p:spPr>
           <a:xfrm>
-            <a:off x="723899" y="1742212"/>
-            <a:ext cx="12192001" cy="923330"/>
+            <a:off x="8990015" y="828954"/>
+            <a:ext cx="3086100" cy="1200329"/>
           </a:xfrm>
           <a:prstGeom prst="rect">
             <a:avLst/>
@@ -3494,43 +3676,107 @@
           <a:noFill/>
         </p:spPr>
         <p:txBody>
-          <a:bodyPr wrap="square" lIns="91440" tIns="45720" rIns="91440" bIns="45720">
+          <a:bodyPr wrap="square" rtlCol="0">
             <a:spAutoFit/>
           </a:bodyPr>
           <a:lstStyle/>
           <a:p>
-            <a:pPr algn="ctr"/>
-            <a:r>
-              <a:rPr lang="en-US" sz="5400" b="1" cap="none" spc="0" dirty="0">
-                <a:ln w="13462">
-                  <a:solidFill>
-                    <a:schemeClr val="bg1"/>
-                  </a:solidFill>
-                  <a:prstDash val="solid"/>
-                </a:ln>
-                <a:solidFill>
-                  <a:schemeClr val="tx1">
-                    <a:lumMod val="85000"/>
-                    <a:lumOff val="15000"/>
-                  </a:schemeClr>
-                </a:solidFill>
-                <a:effectLst>
-                  <a:outerShdw dist="38100" dir="2700000" algn="bl" rotWithShape="0">
-                    <a:schemeClr val="accent5"/>
-                  </a:outerShdw>
-                </a:effectLst>
-              </a:rPr>
-              <a:t>Tyreece Scarlett S4103766</a:t>
-            </a:r>
-          </a:p>
-        </p:txBody>
-      </p:sp>
-      <p:sp>
-        <p:nvSpPr>
-          <p:cNvPr id="3" name="TextBox 2">
-            <a:extLst>
-              <a:ext uri="{FF2B5EF4-FFF2-40B4-BE49-F238E27FC236}">
-                <a16:creationId xmlns:a16="http://schemas.microsoft.com/office/drawing/2014/main" id="{4F9E4E17-EE39-6DCA-BF1E-5266BEAC9B92}"/>
+            <a:pPr marL="0" marR="0" lvl="0" indent="0" algn="l" defTabSz="914400" rtl="0" eaLnBrk="0" fontAlgn="base" latinLnBrk="0" hangingPunct="0">
+              <a:lnSpc>
+                <a:spcPct val="100000"/>
+              </a:lnSpc>
+              <a:spcBef>
+                <a:spcPct val="0"/>
+              </a:spcBef>
+              <a:spcAft>
+                <a:spcPct val="0"/>
+              </a:spcAft>
+              <a:buClrTx/>
+              <a:buSzTx/>
+              <a:tabLst/>
+            </a:pPr>
+            <a:r>
+              <a:rPr lang="en-GB" u="sng" dirty="0"/>
+              <a:t>Key Scripts Involved:</a:t>
+            </a:r>
+          </a:p>
+          <a:p>
+            <a:pPr marL="285750" marR="0" lvl="0" indent="-285750" algn="l" defTabSz="914400" rtl="0" eaLnBrk="0" fontAlgn="base" latinLnBrk="0" hangingPunct="0">
+              <a:lnSpc>
+                <a:spcPct val="100000"/>
+              </a:lnSpc>
+              <a:spcBef>
+                <a:spcPct val="0"/>
+              </a:spcBef>
+              <a:spcAft>
+                <a:spcPct val="0"/>
+              </a:spcAft>
+              <a:buClrTx/>
+              <a:buSzTx/>
+              <a:buFont typeface="Arial" panose="020B0604020202020204" pitchFamily="34" charset="0"/>
+              <a:buChar char="•"/>
+              <a:tabLst/>
+            </a:pPr>
+            <a:r>
+              <a:rPr lang="en-GB" dirty="0" err="1"/>
+              <a:t>SmartAimAssist.cs</a:t>
+            </a:r>
+            <a:endParaRPr lang="en-GB" dirty="0"/>
+          </a:p>
+          <a:p>
+            <a:pPr marL="285750" marR="0" lvl="0" indent="-285750" algn="l" defTabSz="914400" rtl="0" eaLnBrk="0" fontAlgn="base" latinLnBrk="0" hangingPunct="0">
+              <a:lnSpc>
+                <a:spcPct val="100000"/>
+              </a:lnSpc>
+              <a:spcBef>
+                <a:spcPct val="0"/>
+              </a:spcBef>
+              <a:spcAft>
+                <a:spcPct val="0"/>
+              </a:spcAft>
+              <a:buClrTx/>
+              <a:buSzTx/>
+              <a:buFont typeface="Arial" panose="020B0604020202020204" pitchFamily="34" charset="0"/>
+              <a:buChar char="•"/>
+              <a:tabLst/>
+            </a:pPr>
+            <a:r>
+              <a:rPr lang="en-GB" dirty="0" err="1"/>
+              <a:t>AiChasePlayerState.cs</a:t>
+            </a:r>
+            <a:endParaRPr lang="en-GB" dirty="0"/>
+          </a:p>
+          <a:p>
+            <a:pPr marL="285750" marR="0" lvl="0" indent="-285750" algn="l" defTabSz="914400" rtl="0" eaLnBrk="0" fontAlgn="base" latinLnBrk="0" hangingPunct="0">
+              <a:lnSpc>
+                <a:spcPct val="100000"/>
+              </a:lnSpc>
+              <a:spcBef>
+                <a:spcPct val="0"/>
+              </a:spcBef>
+              <a:spcAft>
+                <a:spcPct val="0"/>
+              </a:spcAft>
+              <a:buClrTx/>
+              <a:buSzTx/>
+              <a:buFont typeface="Arial" panose="020B0604020202020204" pitchFamily="34" charset="0"/>
+              <a:buChar char="•"/>
+              <a:tabLst/>
+            </a:pPr>
+            <a:r>
+              <a:rPr lang="en-GB" dirty="0" err="1"/>
+              <a:t>EnemyHealth.cs</a:t>
+            </a:r>
+            <a:endParaRPr lang="en-GB" dirty="0"/>
+          </a:p>
+        </p:txBody>
+      </p:sp>
+      <p:sp>
+        <p:nvSpPr>
+          <p:cNvPr id="20" name="TextBox 19">
+            <a:extLst>
+              <a:ext uri="{FF2B5EF4-FFF2-40B4-BE49-F238E27FC236}">
+                <a16:creationId xmlns:a16="http://schemas.microsoft.com/office/drawing/2014/main" id="{456171EC-1168-8F38-F9BD-F299D77156EE}"/>
               </a:ext>
             </a:extLst>
           </p:cNvPr>
@@ -3539,8 +3785,8 @@
         </p:nvSpPr>
         <p:spPr>
           <a:xfrm>
-            <a:off x="6669313" y="3429000"/>
-            <a:ext cx="5114441" cy="2031325"/>
+            <a:off x="8990015" y="2029283"/>
+            <a:ext cx="3086100" cy="2031325"/>
           </a:xfrm>
           <a:prstGeom prst="rect">
             <a:avLst/>
@@ -3553,26 +3799,84 @@
           </a:bodyPr>
           <a:lstStyle/>
           <a:p>
+            <a:pPr marL="0" marR="0" lvl="0" indent="0" algn="l" defTabSz="914400" rtl="0" eaLnBrk="0" fontAlgn="base" latinLnBrk="0" hangingPunct="0">
+              <a:lnSpc>
+                <a:spcPct val="100000"/>
+              </a:lnSpc>
+              <a:spcBef>
+                <a:spcPct val="0"/>
+              </a:spcBef>
+              <a:spcAft>
+                <a:spcPct val="0"/>
+              </a:spcAft>
+              <a:buClrTx/>
+              <a:buSzTx/>
+              <a:tabLst/>
+            </a:pPr>
+            <a:r>
+              <a:rPr lang="en-GB" u="sng" dirty="0"/>
+              <a:t>Insights:</a:t>
+            </a:r>
+            <a:br>
+              <a:rPr lang="en-GB" dirty="0"/>
+            </a:br>
             <a:r>
               <a:rPr lang="en-US" dirty="0"/>
-              <a:t>Conclusion</a:t>
+              <a:t>Aim assist significantly improves hit accuracy.</a:t>
             </a:r>
             <a:br>
               <a:rPr lang="en-US" dirty="0"/>
             </a:br>
             <a:r>
               <a:rPr lang="en-US" dirty="0"/>
-              <a:t>Aim assist is a valuable accessibility and balance tool, but it needs to be thoughtfully designed and properly tuned. Developers must consider player input, platform parity, and game fairness to make it a feature that enhances rather than disrupts the experience.</a:t>
-            </a:r>
-          </a:p>
-        </p:txBody>
-      </p:sp>
-      <p:sp>
-        <p:nvSpPr>
-          <p:cNvPr id="7" name="TextBox 6">
-            <a:extLst>
-              <a:ext uri="{FF2B5EF4-FFF2-40B4-BE49-F238E27FC236}">
-                <a16:creationId xmlns:a16="http://schemas.microsoft.com/office/drawing/2014/main" id="{E8C2EC54-B165-A57C-5B26-A46799D8F716}"/>
+              <a:t>Player skill can Improve whilst locked onto a target arise around fairness in PvP environments.</a:t>
+            </a:r>
+            <a:endParaRPr lang="en-GB" dirty="0"/>
+          </a:p>
+        </p:txBody>
+      </p:sp>
+      <p:pic>
+        <p:nvPicPr>
+          <p:cNvPr id="23" name="Picture 22" descr="A grey camera on a white background&#10;&#10;AI-generated content may be incorrect.">
+            <a:extLst>
+              <a:ext uri="{FF2B5EF4-FFF2-40B4-BE49-F238E27FC236}">
+                <a16:creationId xmlns:a16="http://schemas.microsoft.com/office/drawing/2014/main" id="{02C3075A-29ED-8E9D-E23A-82EC93DB73FC}"/>
+              </a:ext>
+            </a:extLst>
+          </p:cNvPr>
+          <p:cNvPicPr>
+            <a:picLocks noChangeAspect="1"/>
+          </p:cNvPicPr>
+          <p:nvPr/>
+        </p:nvPicPr>
+        <p:blipFill>
+          <a:blip r:embed="rId2">
+            <a:extLst>
+              <a:ext uri="{28A0092B-C50C-407E-A947-70E740481C1C}">
+                <a14:useLocalDpi xmlns:a14="http://schemas.microsoft.com/office/drawing/2010/main" val="0"/>
+              </a:ext>
+            </a:extLst>
+          </a:blip>
+          <a:stretch>
+            <a:fillRect/>
+          </a:stretch>
+        </p:blipFill>
+        <p:spPr>
+          <a:xfrm>
+            <a:off x="3009900" y="828954"/>
+            <a:ext cx="3086100" cy="3086100"/>
+          </a:xfrm>
+          <a:prstGeom prst="rect">
+            <a:avLst/>
+          </a:prstGeom>
+        </p:spPr>
+      </p:pic>
+      <p:sp>
+        <p:nvSpPr>
+          <p:cNvPr id="24" name="TextBox 23">
+            <a:extLst>
+              <a:ext uri="{FF2B5EF4-FFF2-40B4-BE49-F238E27FC236}">
+                <a16:creationId xmlns:a16="http://schemas.microsoft.com/office/drawing/2014/main" id="{1E8A4299-8BFB-6431-96EE-646435C25E8F}"/>
               </a:ext>
             </a:extLst>
           </p:cNvPr>
@@ -3581,8 +3885,8 @@
         </p:nvSpPr>
         <p:spPr>
           <a:xfrm>
-            <a:off x="0" y="6527126"/>
-            <a:ext cx="5114441" cy="369332"/>
+            <a:off x="-76200" y="5751095"/>
+            <a:ext cx="3086100" cy="369332"/>
           </a:xfrm>
           <a:prstGeom prst="rect">
             <a:avLst/>
@@ -3595,10 +3899,136 @@
           </a:bodyPr>
           <a:lstStyle/>
           <a:p>
+            <a:pPr marL="0" marR="0" lvl="0" indent="0" algn="l" defTabSz="914400" rtl="0" eaLnBrk="0" fontAlgn="base" latinLnBrk="0" hangingPunct="0">
+              <a:lnSpc>
+                <a:spcPct val="100000"/>
+              </a:lnSpc>
+              <a:spcBef>
+                <a:spcPct val="0"/>
+              </a:spcBef>
+              <a:spcAft>
+                <a:spcPct val="0"/>
+              </a:spcAft>
+              <a:buClrTx/>
+              <a:buSzTx/>
+              <a:tabLst/>
+            </a:pPr>
+            <a:r>
+              <a:rPr lang="en-US" u="sng" dirty="0"/>
+              <a:t>References:</a:t>
+            </a:r>
+            <a:endParaRPr lang="en-GB" dirty="0"/>
+          </a:p>
+        </p:txBody>
+      </p:sp>
+      <p:sp>
+        <p:nvSpPr>
+          <p:cNvPr id="25" name="TextBox 24">
+            <a:extLst>
+              <a:ext uri="{FF2B5EF4-FFF2-40B4-BE49-F238E27FC236}">
+                <a16:creationId xmlns:a16="http://schemas.microsoft.com/office/drawing/2014/main" id="{9CE41FD1-CCA5-98E2-2A74-E63042BC650C}"/>
+              </a:ext>
+            </a:extLst>
+          </p:cNvPr>
+          <p:cNvSpPr txBox="1"/>
+          <p:nvPr/>
+        </p:nvSpPr>
+        <p:spPr>
+          <a:xfrm>
+            <a:off x="8990015" y="3962462"/>
+            <a:ext cx="3086100" cy="3693319"/>
+          </a:xfrm>
+          <a:prstGeom prst="rect">
+            <a:avLst/>
+          </a:prstGeom>
+          <a:noFill/>
+        </p:spPr>
+        <p:txBody>
+          <a:bodyPr wrap="square" rtlCol="0">
+            <a:spAutoFit/>
+          </a:bodyPr>
+          <a:lstStyle/>
+          <a:p>
+            <a:pPr marL="0" marR="0" lvl="0" indent="0" algn="l" defTabSz="914400" rtl="0" eaLnBrk="0" fontAlgn="base" latinLnBrk="0" hangingPunct="0">
+              <a:lnSpc>
+                <a:spcPct val="100000"/>
+              </a:lnSpc>
+              <a:spcBef>
+                <a:spcPct val="0"/>
+              </a:spcBef>
+              <a:spcAft>
+                <a:spcPct val="0"/>
+              </a:spcAft>
+              <a:buClrTx/>
+              <a:buSzTx/>
+              <a:tabLst/>
+            </a:pPr>
+            <a:r>
+              <a:rPr lang="en-US" u="sng" dirty="0"/>
+              <a:t>Conclusion: </a:t>
+            </a:r>
             <a:r>
               <a:rPr lang="en-US" dirty="0"/>
-              <a:t>References </a:t>
-            </a:r>
+              <a:t>Aim assist can significantly improve player accuracy by helping align the crosshair with targets more effectively, especially in fast-paced or controller-based gameplay. By compensating for limited input precision and reducing the time needed to aim manually, aim assist enhances player performance and responsiveness. </a:t>
+            </a:r>
+            <a:endParaRPr lang="en-GB" dirty="0"/>
+          </a:p>
+        </p:txBody>
+      </p:sp>
+      <p:sp>
+        <p:nvSpPr>
+          <p:cNvPr id="27" name="TextBox 26">
+            <a:extLst>
+              <a:ext uri="{FF2B5EF4-FFF2-40B4-BE49-F238E27FC236}">
+                <a16:creationId xmlns:a16="http://schemas.microsoft.com/office/drawing/2014/main" id="{5B14DEEC-EF85-20E4-1137-EDC7FD93142C}"/>
+              </a:ext>
+            </a:extLst>
+          </p:cNvPr>
+          <p:cNvSpPr txBox="1"/>
+          <p:nvPr/>
+        </p:nvSpPr>
+        <p:spPr>
+          <a:xfrm>
+            <a:off x="2913857" y="5705880"/>
+            <a:ext cx="3086100" cy="646331"/>
+          </a:xfrm>
+          <a:prstGeom prst="rect">
+            <a:avLst/>
+          </a:prstGeom>
+          <a:noFill/>
+        </p:spPr>
+        <p:txBody>
+          <a:bodyPr wrap="square" rtlCol="0">
+            <a:spAutoFit/>
+          </a:bodyPr>
+          <a:lstStyle/>
+          <a:p>
+            <a:pPr marL="0" marR="0" lvl="0" indent="0" algn="l" defTabSz="914400" rtl="0" eaLnBrk="0" fontAlgn="base" latinLnBrk="0" hangingPunct="0">
+              <a:lnSpc>
+                <a:spcPct val="100000"/>
+              </a:lnSpc>
+              <a:spcBef>
+                <a:spcPct val="0"/>
+              </a:spcBef>
+              <a:spcAft>
+                <a:spcPct val="0"/>
+              </a:spcAft>
+              <a:buClrTx/>
+              <a:buSzTx/>
+              <a:tabLst/>
+            </a:pPr>
+            <a:r>
+              <a:rPr lang="en-US" u="sng" dirty="0"/>
+              <a:t>Tyreece Scarlett</a:t>
+            </a:r>
+            <a:br>
+              <a:rPr lang="en-US" u="sng" dirty="0"/>
+            </a:br>
+            <a:r>
+              <a:rPr lang="en-US" u="sng" dirty="0"/>
+              <a:t>S4103766</a:t>
+            </a:r>
+            <a:endParaRPr lang="en-GB" dirty="0"/>
           </a:p>
         </p:txBody>
       </p:sp>

</xml_diff>